<commit_message>
Week of May 5
- add 'target' to 'item' structure for when item.type is URL/XID
- clean-up samples
- add `resourceattributes` under Resource model definition
  - Now we have `resourceattributes`, `metaattributes` and `attributes`
- fix typos in the sample picts

Fixes: #335
Fixes: #337
Fixes: #342
Fixes: #293

Signed-off-by: Doug Davis <duglin@gmail.com>
</commit_message>
<xml_diff>
--- a/core/diagrams.pptx
+++ b/core/diagrams.pptx
@@ -201,7 +201,7 @@
           <a:p>
             <a:fld id="{E188976F-3982-2041-A5CF-049F939996BC}" type="datetimeFigureOut">
               <a:rPr lang="en-US" smtClean="0"/>
-              <a:t>7/31/23</a:t>
+              <a:t>5/7/25</a:t>
             </a:fld>
             <a:endParaRPr lang="en-US"/>
           </a:p>
@@ -783,7 +783,7 @@
           <a:p>
             <a:fld id="{1498B001-AB4D-AE41-AF6F-CC32DCD73862}" type="datetimeFigureOut">
               <a:rPr lang="en-US" smtClean="0"/>
-              <a:t>7/31/23</a:t>
+              <a:t>5/7/25</a:t>
             </a:fld>
             <a:endParaRPr lang="en-US"/>
           </a:p>
@@ -981,7 +981,7 @@
           <a:p>
             <a:fld id="{1498B001-AB4D-AE41-AF6F-CC32DCD73862}" type="datetimeFigureOut">
               <a:rPr lang="en-US" smtClean="0"/>
-              <a:t>7/31/23</a:t>
+              <a:t>5/7/25</a:t>
             </a:fld>
             <a:endParaRPr lang="en-US"/>
           </a:p>
@@ -1189,7 +1189,7 @@
           <a:p>
             <a:fld id="{1498B001-AB4D-AE41-AF6F-CC32DCD73862}" type="datetimeFigureOut">
               <a:rPr lang="en-US" smtClean="0"/>
-              <a:t>7/31/23</a:t>
+              <a:t>5/7/25</a:t>
             </a:fld>
             <a:endParaRPr lang="en-US"/>
           </a:p>
@@ -1387,7 +1387,7 @@
           <a:p>
             <a:fld id="{1498B001-AB4D-AE41-AF6F-CC32DCD73862}" type="datetimeFigureOut">
               <a:rPr lang="en-US" smtClean="0"/>
-              <a:t>7/31/23</a:t>
+              <a:t>5/7/25</a:t>
             </a:fld>
             <a:endParaRPr lang="en-US"/>
           </a:p>
@@ -1662,7 +1662,7 @@
           <a:p>
             <a:fld id="{1498B001-AB4D-AE41-AF6F-CC32DCD73862}" type="datetimeFigureOut">
               <a:rPr lang="en-US" smtClean="0"/>
-              <a:t>7/31/23</a:t>
+              <a:t>5/7/25</a:t>
             </a:fld>
             <a:endParaRPr lang="en-US"/>
           </a:p>
@@ -1927,7 +1927,7 @@
           <a:p>
             <a:fld id="{1498B001-AB4D-AE41-AF6F-CC32DCD73862}" type="datetimeFigureOut">
               <a:rPr lang="en-US" smtClean="0"/>
-              <a:t>7/31/23</a:t>
+              <a:t>5/7/25</a:t>
             </a:fld>
             <a:endParaRPr lang="en-US"/>
           </a:p>
@@ -2339,7 +2339,7 @@
           <a:p>
             <a:fld id="{1498B001-AB4D-AE41-AF6F-CC32DCD73862}" type="datetimeFigureOut">
               <a:rPr lang="en-US" smtClean="0"/>
-              <a:t>7/31/23</a:t>
+              <a:t>5/7/25</a:t>
             </a:fld>
             <a:endParaRPr lang="en-US"/>
           </a:p>
@@ -2480,7 +2480,7 @@
           <a:p>
             <a:fld id="{1498B001-AB4D-AE41-AF6F-CC32DCD73862}" type="datetimeFigureOut">
               <a:rPr lang="en-US" smtClean="0"/>
-              <a:t>7/31/23</a:t>
+              <a:t>5/7/25</a:t>
             </a:fld>
             <a:endParaRPr lang="en-US"/>
           </a:p>
@@ -2593,7 +2593,7 @@
           <a:p>
             <a:fld id="{1498B001-AB4D-AE41-AF6F-CC32DCD73862}" type="datetimeFigureOut">
               <a:rPr lang="en-US" smtClean="0"/>
-              <a:t>7/31/23</a:t>
+              <a:t>5/7/25</a:t>
             </a:fld>
             <a:endParaRPr lang="en-US"/>
           </a:p>
@@ -2904,7 +2904,7 @@
           <a:p>
             <a:fld id="{1498B001-AB4D-AE41-AF6F-CC32DCD73862}" type="datetimeFigureOut">
               <a:rPr lang="en-US" smtClean="0"/>
-              <a:t>7/31/23</a:t>
+              <a:t>5/7/25</a:t>
             </a:fld>
             <a:endParaRPr lang="en-US"/>
           </a:p>
@@ -3192,7 +3192,7 @@
           <a:p>
             <a:fld id="{1498B001-AB4D-AE41-AF6F-CC32DCD73862}" type="datetimeFigureOut">
               <a:rPr lang="en-US" smtClean="0"/>
-              <a:t>7/31/23</a:t>
+              <a:t>5/7/25</a:t>
             </a:fld>
             <a:endParaRPr lang="en-US"/>
           </a:p>
@@ -3433,7 +3433,7 @@
           <a:p>
             <a:fld id="{1498B001-AB4D-AE41-AF6F-CC32DCD73862}" type="datetimeFigureOut">
               <a:rPr lang="en-US" smtClean="0"/>
-              <a:t>7/31/23</a:t>
+              <a:t>5/7/25</a:t>
             </a:fld>
             <a:endParaRPr lang="en-US"/>
           </a:p>
@@ -12239,7 +12239,7 @@
                   <a:schemeClr val="tx1"/>
                 </a:solidFill>
               </a:rPr>
-              <a:t>Groups</a:t>
+              <a:t>Group 2</a:t>
             </a:r>
           </a:p>
         </p:txBody>
@@ -12418,7 +12418,7 @@
                   <a:schemeClr val="tx1"/>
                 </a:solidFill>
               </a:rPr>
-              <a:t>Groups</a:t>
+              <a:t>Group 1</a:t>
             </a:r>
           </a:p>
         </p:txBody>
@@ -13336,7 +13336,7 @@
                   <a:schemeClr val="tx1"/>
                 </a:solidFill>
               </a:rPr>
-              <a:t>Msg Def Versions</a:t>
+              <a:t>Msg Def Version</a:t>
             </a:r>
           </a:p>
         </p:txBody>

</xml_diff>

<commit_message>
Week of Sep 1
- New text and moving more stuff around
- add definition of "capabilities" attribute to Registry entity's list of attributes
- info about the different 'views'

Signed-off-by: Doug Davis <duglin@gmail.com>
</commit_message>
<xml_diff>
--- a/core/diagrams.pptx
+++ b/core/diagrams.pptx
@@ -5,7 +5,7 @@
     <p:sldMasterId id="2147483648" r:id="rId1"/>
   </p:sldMasterIdLst>
   <p:notesMasterIdLst>
-    <p:notesMasterId r:id="rId7"/>
+    <p:notesMasterId r:id="rId8"/>
   </p:notesMasterIdLst>
   <p:sldIdLst>
     <p:sldId id="257" r:id="rId2"/>
@@ -13,6 +13,7 @@
     <p:sldId id="260" r:id="rId4"/>
     <p:sldId id="256" r:id="rId5"/>
     <p:sldId id="258" r:id="rId6"/>
+    <p:sldId id="263" r:id="rId7"/>
   </p:sldIdLst>
   <p:sldSz cx="12192000" cy="6858000"/>
   <p:notesSz cx="6858000" cy="9144000"/>
@@ -201,7 +202,7 @@
           <a:p>
             <a:fld id="{E188976F-3982-2041-A5CF-049F939996BC}" type="datetimeFigureOut">
               <a:rPr lang="en-US" smtClean="0"/>
-              <a:t>5/7/25</a:t>
+              <a:t>9/4/25</a:t>
             </a:fld>
             <a:endParaRPr lang="en-US"/>
           </a:p>
@@ -496,6 +497,13 @@
           </p:nvPr>
         </p:nvSpPr>
         <p:spPr/>
+        <p:txBody>
+          <a:bodyPr/>
+          <a:lstStyle/>
+          <a:p>
+            <a:endParaRPr lang="en-US"/>
+          </a:p>
+        </p:txBody>
       </p:sp>
       <p:sp>
         <p:nvSpPr>
@@ -580,6 +588,13 @@
           </p:nvPr>
         </p:nvSpPr>
         <p:spPr/>
+        <p:txBody>
+          <a:bodyPr/>
+          <a:lstStyle/>
+          <a:p>
+            <a:endParaRPr lang="en-US"/>
+          </a:p>
+        </p:txBody>
       </p:sp>
       <p:sp>
         <p:nvSpPr>
@@ -783,7 +798,7 @@
           <a:p>
             <a:fld id="{1498B001-AB4D-AE41-AF6F-CC32DCD73862}" type="datetimeFigureOut">
               <a:rPr lang="en-US" smtClean="0"/>
-              <a:t>5/7/25</a:t>
+              <a:t>9/4/25</a:t>
             </a:fld>
             <a:endParaRPr lang="en-US"/>
           </a:p>
@@ -981,7 +996,7 @@
           <a:p>
             <a:fld id="{1498B001-AB4D-AE41-AF6F-CC32DCD73862}" type="datetimeFigureOut">
               <a:rPr lang="en-US" smtClean="0"/>
-              <a:t>5/7/25</a:t>
+              <a:t>9/4/25</a:t>
             </a:fld>
             <a:endParaRPr lang="en-US"/>
           </a:p>
@@ -1189,7 +1204,7 @@
           <a:p>
             <a:fld id="{1498B001-AB4D-AE41-AF6F-CC32DCD73862}" type="datetimeFigureOut">
               <a:rPr lang="en-US" smtClean="0"/>
-              <a:t>5/7/25</a:t>
+              <a:t>9/4/25</a:t>
             </a:fld>
             <a:endParaRPr lang="en-US"/>
           </a:p>
@@ -1387,7 +1402,7 @@
           <a:p>
             <a:fld id="{1498B001-AB4D-AE41-AF6F-CC32DCD73862}" type="datetimeFigureOut">
               <a:rPr lang="en-US" smtClean="0"/>
-              <a:t>5/7/25</a:t>
+              <a:t>9/4/25</a:t>
             </a:fld>
             <a:endParaRPr lang="en-US"/>
           </a:p>
@@ -1662,7 +1677,7 @@
           <a:p>
             <a:fld id="{1498B001-AB4D-AE41-AF6F-CC32DCD73862}" type="datetimeFigureOut">
               <a:rPr lang="en-US" smtClean="0"/>
-              <a:t>5/7/25</a:t>
+              <a:t>9/4/25</a:t>
             </a:fld>
             <a:endParaRPr lang="en-US"/>
           </a:p>
@@ -1927,7 +1942,7 @@
           <a:p>
             <a:fld id="{1498B001-AB4D-AE41-AF6F-CC32DCD73862}" type="datetimeFigureOut">
               <a:rPr lang="en-US" smtClean="0"/>
-              <a:t>5/7/25</a:t>
+              <a:t>9/4/25</a:t>
             </a:fld>
             <a:endParaRPr lang="en-US"/>
           </a:p>
@@ -2339,7 +2354,7 @@
           <a:p>
             <a:fld id="{1498B001-AB4D-AE41-AF6F-CC32DCD73862}" type="datetimeFigureOut">
               <a:rPr lang="en-US" smtClean="0"/>
-              <a:t>5/7/25</a:t>
+              <a:t>9/4/25</a:t>
             </a:fld>
             <a:endParaRPr lang="en-US"/>
           </a:p>
@@ -2480,7 +2495,7 @@
           <a:p>
             <a:fld id="{1498B001-AB4D-AE41-AF6F-CC32DCD73862}" type="datetimeFigureOut">
               <a:rPr lang="en-US" smtClean="0"/>
-              <a:t>5/7/25</a:t>
+              <a:t>9/4/25</a:t>
             </a:fld>
             <a:endParaRPr lang="en-US"/>
           </a:p>
@@ -2593,7 +2608,7 @@
           <a:p>
             <a:fld id="{1498B001-AB4D-AE41-AF6F-CC32DCD73862}" type="datetimeFigureOut">
               <a:rPr lang="en-US" smtClean="0"/>
-              <a:t>5/7/25</a:t>
+              <a:t>9/4/25</a:t>
             </a:fld>
             <a:endParaRPr lang="en-US"/>
           </a:p>
@@ -2904,7 +2919,7 @@
           <a:p>
             <a:fld id="{1498B001-AB4D-AE41-AF6F-CC32DCD73862}" type="datetimeFigureOut">
               <a:rPr lang="en-US" smtClean="0"/>
-              <a:t>5/7/25</a:t>
+              <a:t>9/4/25</a:t>
             </a:fld>
             <a:endParaRPr lang="en-US"/>
           </a:p>
@@ -3192,7 +3207,7 @@
           <a:p>
             <a:fld id="{1498B001-AB4D-AE41-AF6F-CC32DCD73862}" type="datetimeFigureOut">
               <a:rPr lang="en-US" smtClean="0"/>
-              <a:t>5/7/25</a:t>
+              <a:t>9/4/25</a:t>
             </a:fld>
             <a:endParaRPr lang="en-US"/>
           </a:p>
@@ -3433,7 +3448,7 @@
           <a:p>
             <a:fld id="{1498B001-AB4D-AE41-AF6F-CC32DCD73862}" type="datetimeFigureOut">
               <a:rPr lang="en-US" smtClean="0"/>
-              <a:t>5/7/25</a:t>
+              <a:t>9/4/25</a:t>
             </a:fld>
             <a:endParaRPr lang="en-US"/>
           </a:p>
@@ -14947,6 +14962,679 @@
     <p:extLst>
       <p:ext uri="{BB962C8B-B14F-4D97-AF65-F5344CB8AC3E}">
         <p14:creationId xmlns:p14="http://schemas.microsoft.com/office/powerpoint/2010/main" val="4162234778"/>
+      </p:ext>
+    </p:extLst>
+  </p:cSld>
+  <p:clrMapOvr>
+    <a:masterClrMapping/>
+  </p:clrMapOvr>
+</p:sld>
+</file>
+
+<file path=ppt/slides/slide6.xml><?xml version="1.0" encoding="utf-8"?>
+<p:sld xmlns:a="http://schemas.openxmlformats.org/drawingml/2006/main" xmlns:r="http://schemas.openxmlformats.org/officeDocument/2006/relationships" xmlns:p="http://schemas.openxmlformats.org/presentationml/2006/main">
+  <p:cSld>
+    <p:spTree>
+      <p:nvGrpSpPr>
+        <p:cNvPr id="1" name=""/>
+        <p:cNvGrpSpPr/>
+        <p:nvPr/>
+      </p:nvGrpSpPr>
+      <p:grpSpPr>
+        <a:xfrm>
+          <a:off x="0" y="0"/>
+          <a:ext cx="0" cy="0"/>
+          <a:chOff x="0" y="0"/>
+          <a:chExt cx="0" cy="0"/>
+        </a:xfrm>
+      </p:grpSpPr>
+      <p:sp>
+        <p:nvSpPr>
+          <p:cNvPr id="14" name="Rounded Rectangle 13">
+            <a:extLst>
+              <a:ext uri="{FF2B5EF4-FFF2-40B4-BE49-F238E27FC236}">
+                <a16:creationId xmlns:a16="http://schemas.microsoft.com/office/drawing/2014/main" id="{6F7DDB85-434C-75C4-C96D-4FE26073848C}"/>
+              </a:ext>
+            </a:extLst>
+          </p:cNvPr>
+          <p:cNvSpPr/>
+          <p:nvPr/>
+        </p:nvSpPr>
+        <p:spPr>
+          <a:xfrm>
+            <a:off x="0" y="1388745"/>
+            <a:ext cx="12039600" cy="3107055"/>
+          </a:xfrm>
+          <a:prstGeom prst="roundRect">
+            <a:avLst>
+              <a:gd name="adj" fmla="val 5010"/>
+            </a:avLst>
+          </a:prstGeom>
+          <a:solidFill>
+            <a:schemeClr val="bg1">
+              <a:lumMod val="95000"/>
+            </a:schemeClr>
+          </a:solidFill>
+          <a:ln>
+            <a:noFill/>
+          </a:ln>
+        </p:spPr>
+        <p:style>
+          <a:lnRef idx="2">
+            <a:schemeClr val="accent1">
+              <a:shade val="15000"/>
+            </a:schemeClr>
+          </a:lnRef>
+          <a:fillRef idx="1">
+            <a:schemeClr val="accent1"/>
+          </a:fillRef>
+          <a:effectRef idx="0">
+            <a:schemeClr val="accent1"/>
+          </a:effectRef>
+          <a:fontRef idx="minor">
+            <a:schemeClr val="lt1"/>
+          </a:fontRef>
+        </p:style>
+        <p:txBody>
+          <a:bodyPr rtlCol="0" anchor="ctr"/>
+          <a:lstStyle/>
+          <a:p>
+            <a:pPr algn="ctr"/>
+            <a:endParaRPr lang="en-US"/>
+          </a:p>
+        </p:txBody>
+      </p:sp>
+      <p:sp>
+        <p:nvSpPr>
+          <p:cNvPr id="12" name="Rectangle 11">
+            <a:extLst>
+              <a:ext uri="{FF2B5EF4-FFF2-40B4-BE49-F238E27FC236}">
+                <a16:creationId xmlns:a16="http://schemas.microsoft.com/office/drawing/2014/main" id="{B4EAA49E-6702-6758-72A9-84887E69085A}"/>
+              </a:ext>
+            </a:extLst>
+          </p:cNvPr>
+          <p:cNvSpPr/>
+          <p:nvPr/>
+        </p:nvSpPr>
+        <p:spPr>
+          <a:xfrm>
+            <a:off x="4343394" y="2301415"/>
+            <a:ext cx="7620006" cy="2035793"/>
+          </a:xfrm>
+          <a:prstGeom prst="rect">
+            <a:avLst/>
+          </a:prstGeom>
+          <a:solidFill>
+            <a:schemeClr val="bg1">
+              <a:lumMod val="95000"/>
+            </a:schemeClr>
+          </a:solidFill>
+          <a:ln>
+            <a:noFill/>
+          </a:ln>
+        </p:spPr>
+        <p:style>
+          <a:lnRef idx="2">
+            <a:schemeClr val="accent1">
+              <a:shade val="15000"/>
+            </a:schemeClr>
+          </a:lnRef>
+          <a:fillRef idx="1">
+            <a:schemeClr val="accent1"/>
+          </a:fillRef>
+          <a:effectRef idx="0">
+            <a:schemeClr val="accent1"/>
+          </a:effectRef>
+          <a:fontRef idx="minor">
+            <a:schemeClr val="lt1"/>
+          </a:fontRef>
+        </p:style>
+        <p:txBody>
+          <a:bodyPr rtlCol="0" anchor="ctr"/>
+          <a:lstStyle/>
+          <a:p>
+            <a:pPr algn="ctr"/>
+            <a:endParaRPr lang="en-US"/>
+          </a:p>
+        </p:txBody>
+      </p:sp>
+      <p:sp>
+        <p:nvSpPr>
+          <p:cNvPr id="11" name="Rectangle 10">
+            <a:extLst>
+              <a:ext uri="{FF2B5EF4-FFF2-40B4-BE49-F238E27FC236}">
+                <a16:creationId xmlns:a16="http://schemas.microsoft.com/office/drawing/2014/main" id="{74BA3606-8FF9-DF90-AA06-51953BF584DA}"/>
+              </a:ext>
+            </a:extLst>
+          </p:cNvPr>
+          <p:cNvSpPr/>
+          <p:nvPr/>
+        </p:nvSpPr>
+        <p:spPr>
+          <a:xfrm>
+            <a:off x="152399" y="1758077"/>
+            <a:ext cx="11353801" cy="381000"/>
+          </a:xfrm>
+          <a:prstGeom prst="rect">
+            <a:avLst/>
+          </a:prstGeom>
+          <a:solidFill>
+            <a:schemeClr val="bg1">
+              <a:lumMod val="95000"/>
+            </a:schemeClr>
+          </a:solidFill>
+          <a:ln>
+            <a:noFill/>
+          </a:ln>
+        </p:spPr>
+        <p:style>
+          <a:lnRef idx="2">
+            <a:schemeClr val="accent1">
+              <a:shade val="15000"/>
+            </a:schemeClr>
+          </a:lnRef>
+          <a:fillRef idx="1">
+            <a:schemeClr val="accent1"/>
+          </a:fillRef>
+          <a:effectRef idx="0">
+            <a:schemeClr val="accent1"/>
+          </a:effectRef>
+          <a:fontRef idx="minor">
+            <a:schemeClr val="lt1"/>
+          </a:fontRef>
+        </p:style>
+        <p:txBody>
+          <a:bodyPr rtlCol="0" anchor="ctr"/>
+          <a:lstStyle/>
+          <a:p>
+            <a:pPr algn="ctr"/>
+            <a:endParaRPr lang="en-US"/>
+          </a:p>
+        </p:txBody>
+      </p:sp>
+      <p:sp>
+        <p:nvSpPr>
+          <p:cNvPr id="2" name="TextBox 1">
+            <a:extLst>
+              <a:ext uri="{FF2B5EF4-FFF2-40B4-BE49-F238E27FC236}">
+                <a16:creationId xmlns:a16="http://schemas.microsoft.com/office/drawing/2014/main" id="{3E6AF24B-F1D7-DD45-B509-4C95215CEB4E}"/>
+              </a:ext>
+            </a:extLst>
+          </p:cNvPr>
+          <p:cNvSpPr txBox="1"/>
+          <p:nvPr/>
+        </p:nvSpPr>
+        <p:spPr>
+          <a:xfrm>
+            <a:off x="152400" y="1758077"/>
+            <a:ext cx="11353800" cy="369332"/>
+          </a:xfrm>
+          <a:prstGeom prst="rect">
+            <a:avLst/>
+          </a:prstGeom>
+          <a:solidFill>
+            <a:schemeClr val="bg1"/>
+          </a:solidFill>
+        </p:spPr>
+        <p:txBody>
+          <a:bodyPr wrap="square" rtlCol="0">
+            <a:spAutoFit/>
+          </a:bodyPr>
+          <a:lstStyle/>
+          <a:p>
+            <a:r>
+              <a:rPr lang="en-US" i="1" dirty="0">
+                <a:latin typeface="Consolas" panose="020B0609020204030204" pitchFamily="49" charset="0"/>
+                <a:cs typeface="Consolas" panose="020B0609020204030204" pitchFamily="49" charset="0"/>
+              </a:rPr>
+              <a:t>https://registry.example.com/prefix</a:t>
+            </a:r>
+            <a:r>
+              <a:rPr lang="en-US" dirty="0">
+                <a:latin typeface="Consolas" panose="020B0609020204030204" pitchFamily="49" charset="0"/>
+                <a:cs typeface="Consolas" panose="020B0609020204030204" pitchFamily="49" charset="0"/>
+              </a:rPr>
+              <a:t>/groupType/groupId/resourceType/resourceID/versions/v1</a:t>
+            </a:r>
+          </a:p>
+        </p:txBody>
+      </p:sp>
+      <p:sp>
+        <p:nvSpPr>
+          <p:cNvPr id="3" name="TextBox 2">
+            <a:extLst>
+              <a:ext uri="{FF2B5EF4-FFF2-40B4-BE49-F238E27FC236}">
+                <a16:creationId xmlns:a16="http://schemas.microsoft.com/office/drawing/2014/main" id="{98AF2D7C-892A-DAA7-5331-7D7E96797E7C}"/>
+              </a:ext>
+            </a:extLst>
+          </p:cNvPr>
+          <p:cNvSpPr txBox="1"/>
+          <p:nvPr/>
+        </p:nvSpPr>
+        <p:spPr>
+          <a:xfrm>
+            <a:off x="152399" y="1388745"/>
+            <a:ext cx="4190995" cy="369332"/>
+          </a:xfrm>
+          <a:prstGeom prst="rect">
+            <a:avLst/>
+          </a:prstGeom>
+          <a:noFill/>
+        </p:spPr>
+        <p:txBody>
+          <a:bodyPr wrap="square" rtlCol="0">
+            <a:spAutoFit/>
+          </a:bodyPr>
+          <a:lstStyle/>
+          <a:p>
+            <a:r>
+              <a:rPr lang="en-US" b="1" dirty="0">
+                <a:latin typeface="Consolas" panose="020B0609020204030204" pitchFamily="49" charset="0"/>
+                <a:cs typeface="Consolas" panose="020B0609020204030204" pitchFamily="49" charset="0"/>
+              </a:rPr>
+              <a:t>Registry entity API/URL:</a:t>
+            </a:r>
+          </a:p>
+        </p:txBody>
+      </p:sp>
+      <p:sp>
+        <p:nvSpPr>
+          <p:cNvPr id="10" name="TextBox 9">
+            <a:extLst>
+              <a:ext uri="{FF2B5EF4-FFF2-40B4-BE49-F238E27FC236}">
+                <a16:creationId xmlns:a16="http://schemas.microsoft.com/office/drawing/2014/main" id="{A1EC3E7B-0E9E-1F93-959C-3E012B2CD526}"/>
+              </a:ext>
+            </a:extLst>
+          </p:cNvPr>
+          <p:cNvSpPr txBox="1"/>
+          <p:nvPr/>
+        </p:nvSpPr>
+        <p:spPr>
+          <a:xfrm>
+            <a:off x="152399" y="2303145"/>
+            <a:ext cx="4190995" cy="369332"/>
+          </a:xfrm>
+          <a:prstGeom prst="rect">
+            <a:avLst/>
+          </a:prstGeom>
+          <a:noFill/>
+        </p:spPr>
+        <p:txBody>
+          <a:bodyPr wrap="square" rtlCol="0">
+            <a:spAutoFit/>
+          </a:bodyPr>
+          <a:lstStyle/>
+          <a:p>
+            <a:r>
+              <a:rPr lang="en-US" b="1" dirty="0">
+                <a:latin typeface="Consolas" panose="020B0609020204030204" pitchFamily="49" charset="0"/>
+                <a:cs typeface="Consolas" panose="020B0609020204030204" pitchFamily="49" charset="0"/>
+              </a:rPr>
+              <a:t>Registry document structure:</a:t>
+            </a:r>
+          </a:p>
+        </p:txBody>
+      </p:sp>
+      <p:sp>
+        <p:nvSpPr>
+          <p:cNvPr id="13" name="TextBox 12">
+            <a:extLst>
+              <a:ext uri="{FF2B5EF4-FFF2-40B4-BE49-F238E27FC236}">
+                <a16:creationId xmlns:a16="http://schemas.microsoft.com/office/drawing/2014/main" id="{87D65F69-DBA2-3539-BE45-B0E15933C766}"/>
+              </a:ext>
+            </a:extLst>
+          </p:cNvPr>
+          <p:cNvSpPr txBox="1"/>
+          <p:nvPr/>
+        </p:nvSpPr>
+        <p:spPr>
+          <a:xfrm>
+            <a:off x="4495794" y="2362200"/>
+            <a:ext cx="7467606" cy="1938992"/>
+          </a:xfrm>
+          <a:prstGeom prst="rect">
+            <a:avLst/>
+          </a:prstGeom>
+          <a:solidFill>
+            <a:schemeClr val="bg1"/>
+          </a:solidFill>
+        </p:spPr>
+        <p:txBody>
+          <a:bodyPr wrap="square" lIns="0" tIns="0" rIns="0" bIns="0" rtlCol="0">
+            <a:spAutoFit/>
+          </a:bodyPr>
+          <a:lstStyle/>
+          <a:p>
+            <a:r>
+              <a:rPr lang="en-US" dirty="0">
+                <a:latin typeface="Consolas" panose="020B0609020204030204" pitchFamily="49" charset="0"/>
+                <a:cs typeface="Consolas" panose="020B0609020204030204" pitchFamily="49" charset="0"/>
+              </a:rPr>
+              <a:t>{</a:t>
+            </a:r>
+          </a:p>
+          <a:p>
+            <a:r>
+              <a:rPr lang="en-US" dirty="0">
+                <a:latin typeface="Consolas" panose="020B0609020204030204" pitchFamily="49" charset="0"/>
+                <a:cs typeface="Consolas" panose="020B0609020204030204" pitchFamily="49" charset="0"/>
+              </a:rPr>
+              <a:t> "groupType": {</a:t>
+            </a:r>
+          </a:p>
+          <a:p>
+            <a:r>
+              <a:rPr lang="en-US" dirty="0">
+                <a:latin typeface="Consolas" panose="020B0609020204030204" pitchFamily="49" charset="0"/>
+                <a:cs typeface="Consolas" panose="020B0609020204030204" pitchFamily="49" charset="0"/>
+              </a:rPr>
+              <a:t>           "groupId": {</a:t>
+            </a:r>
+          </a:p>
+          <a:p>
+            <a:r>
+              <a:rPr lang="en-US" dirty="0">
+                <a:latin typeface="Consolas" panose="020B0609020204030204" pitchFamily="49" charset="0"/>
+                <a:cs typeface="Consolas" panose="020B0609020204030204" pitchFamily="49" charset="0"/>
+              </a:rPr>
+              <a:t>                   "resourceType": {</a:t>
+            </a:r>
+          </a:p>
+          <a:p>
+            <a:r>
+              <a:rPr lang="en-US" dirty="0">
+                <a:latin typeface="Consolas" panose="020B0609020204030204" pitchFamily="49" charset="0"/>
+                <a:cs typeface="Consolas" panose="020B0609020204030204" pitchFamily="49" charset="0"/>
+              </a:rPr>
+              <a:t>                                "resourceId": {</a:t>
+            </a:r>
+          </a:p>
+          <a:p>
+            <a:r>
+              <a:rPr lang="en-US" dirty="0">
+                <a:latin typeface="Consolas" panose="020B0609020204030204" pitchFamily="49" charset="0"/>
+                <a:cs typeface="Consolas" panose="020B0609020204030204" pitchFamily="49" charset="0"/>
+              </a:rPr>
+              <a:t>                                           "versions": {</a:t>
+            </a:r>
+          </a:p>
+          <a:p>
+            <a:r>
+              <a:rPr lang="en-US" dirty="0">
+                <a:latin typeface="Consolas" panose="020B0609020204030204" pitchFamily="49" charset="0"/>
+                <a:cs typeface="Consolas" panose="020B0609020204030204" pitchFamily="49" charset="0"/>
+              </a:rPr>
+              <a:t>                                                    "v1": {</a:t>
+            </a:r>
+          </a:p>
+        </p:txBody>
+      </p:sp>
+      <p:cxnSp>
+        <p:nvCxnSpPr>
+          <p:cNvPr id="4" name="Straight Arrow Connector 3">
+            <a:extLst>
+              <a:ext uri="{FF2B5EF4-FFF2-40B4-BE49-F238E27FC236}">
+                <a16:creationId xmlns:a16="http://schemas.microsoft.com/office/drawing/2014/main" id="{EFF53613-115A-60F0-36E7-F4831A84627D}"/>
+              </a:ext>
+            </a:extLst>
+          </p:cNvPr>
+          <p:cNvCxnSpPr/>
+          <p:nvPr/>
+        </p:nvCxnSpPr>
+        <p:spPr>
+          <a:xfrm>
+            <a:off x="5334000" y="2139077"/>
+            <a:ext cx="0" cy="533400"/>
+          </a:xfrm>
+          <a:prstGeom prst="straightConnector1">
+            <a:avLst/>
+          </a:prstGeom>
+          <a:ln w="25400">
+            <a:solidFill>
+              <a:schemeClr val="tx1"/>
+            </a:solidFill>
+            <a:tailEnd type="stealth" w="lg" len="lg"/>
+          </a:ln>
+        </p:spPr>
+        <p:style>
+          <a:lnRef idx="1">
+            <a:schemeClr val="accent1"/>
+          </a:lnRef>
+          <a:fillRef idx="0">
+            <a:schemeClr val="accent1"/>
+          </a:fillRef>
+          <a:effectRef idx="0">
+            <a:schemeClr val="accent1"/>
+          </a:effectRef>
+          <a:fontRef idx="minor">
+            <a:schemeClr val="tx1"/>
+          </a:fontRef>
+        </p:style>
+      </p:cxnSp>
+      <p:cxnSp>
+        <p:nvCxnSpPr>
+          <p:cNvPr id="5" name="Straight Arrow Connector 4">
+            <a:extLst>
+              <a:ext uri="{FF2B5EF4-FFF2-40B4-BE49-F238E27FC236}">
+                <a16:creationId xmlns:a16="http://schemas.microsoft.com/office/drawing/2014/main" id="{5501C655-F471-9097-0119-D34B17CC0B58}"/>
+              </a:ext>
+            </a:extLst>
+          </p:cNvPr>
+          <p:cNvCxnSpPr>
+            <a:cxnSpLocks/>
+          </p:cNvCxnSpPr>
+          <p:nvPr/>
+        </p:nvCxnSpPr>
+        <p:spPr>
+          <a:xfrm>
+            <a:off x="6477000" y="2139077"/>
+            <a:ext cx="0" cy="762000"/>
+          </a:xfrm>
+          <a:prstGeom prst="straightConnector1">
+            <a:avLst/>
+          </a:prstGeom>
+          <a:ln w="25400">
+            <a:solidFill>
+              <a:schemeClr val="tx1"/>
+            </a:solidFill>
+            <a:tailEnd type="stealth" w="lg" len="lg"/>
+          </a:ln>
+        </p:spPr>
+        <p:style>
+          <a:lnRef idx="1">
+            <a:schemeClr val="accent1"/>
+          </a:lnRef>
+          <a:fillRef idx="0">
+            <a:schemeClr val="accent1"/>
+          </a:fillRef>
+          <a:effectRef idx="0">
+            <a:schemeClr val="accent1"/>
+          </a:effectRef>
+          <a:fontRef idx="minor">
+            <a:schemeClr val="tx1"/>
+          </a:fontRef>
+        </p:style>
+      </p:cxnSp>
+      <p:cxnSp>
+        <p:nvCxnSpPr>
+          <p:cNvPr id="6" name="Straight Arrow Connector 5">
+            <a:extLst>
+              <a:ext uri="{FF2B5EF4-FFF2-40B4-BE49-F238E27FC236}">
+                <a16:creationId xmlns:a16="http://schemas.microsoft.com/office/drawing/2014/main" id="{1A97C529-A97C-7422-E522-9E7B4D8B56FF}"/>
+              </a:ext>
+            </a:extLst>
+          </p:cNvPr>
+          <p:cNvCxnSpPr>
+            <a:cxnSpLocks/>
+          </p:cNvCxnSpPr>
+          <p:nvPr/>
+        </p:nvCxnSpPr>
+        <p:spPr>
+          <a:xfrm>
+            <a:off x="7696200" y="2139077"/>
+            <a:ext cx="0" cy="1066800"/>
+          </a:xfrm>
+          <a:prstGeom prst="straightConnector1">
+            <a:avLst/>
+          </a:prstGeom>
+          <a:ln w="25400">
+            <a:solidFill>
+              <a:schemeClr val="tx1"/>
+            </a:solidFill>
+            <a:tailEnd type="stealth" w="lg" len="lg"/>
+          </a:ln>
+        </p:spPr>
+        <p:style>
+          <a:lnRef idx="1">
+            <a:schemeClr val="accent1"/>
+          </a:lnRef>
+          <a:fillRef idx="0">
+            <a:schemeClr val="accent1"/>
+          </a:fillRef>
+          <a:effectRef idx="0">
+            <a:schemeClr val="accent1"/>
+          </a:effectRef>
+          <a:fontRef idx="minor">
+            <a:schemeClr val="tx1"/>
+          </a:fontRef>
+        </p:style>
+      </p:cxnSp>
+      <p:cxnSp>
+        <p:nvCxnSpPr>
+          <p:cNvPr id="7" name="Straight Arrow Connector 6">
+            <a:extLst>
+              <a:ext uri="{FF2B5EF4-FFF2-40B4-BE49-F238E27FC236}">
+                <a16:creationId xmlns:a16="http://schemas.microsoft.com/office/drawing/2014/main" id="{E88BE655-F123-FD26-B880-779F3A99CBFC}"/>
+              </a:ext>
+            </a:extLst>
+          </p:cNvPr>
+          <p:cNvCxnSpPr>
+            <a:cxnSpLocks/>
+          </p:cNvCxnSpPr>
+          <p:nvPr/>
+        </p:nvCxnSpPr>
+        <p:spPr>
+          <a:xfrm>
+            <a:off x="9296400" y="2139077"/>
+            <a:ext cx="0" cy="1371600"/>
+          </a:xfrm>
+          <a:prstGeom prst="straightConnector1">
+            <a:avLst/>
+          </a:prstGeom>
+          <a:ln w="25400">
+            <a:solidFill>
+              <a:schemeClr val="tx1"/>
+            </a:solidFill>
+            <a:tailEnd type="stealth" w="lg" len="lg"/>
+          </a:ln>
+        </p:spPr>
+        <p:style>
+          <a:lnRef idx="1">
+            <a:schemeClr val="accent1"/>
+          </a:lnRef>
+          <a:fillRef idx="0">
+            <a:schemeClr val="accent1"/>
+          </a:fillRef>
+          <a:effectRef idx="0">
+            <a:schemeClr val="accent1"/>
+          </a:effectRef>
+          <a:fontRef idx="minor">
+            <a:schemeClr val="tx1"/>
+          </a:fontRef>
+        </p:style>
+      </p:cxnSp>
+      <p:cxnSp>
+        <p:nvCxnSpPr>
+          <p:cNvPr id="8" name="Straight Arrow Connector 7">
+            <a:extLst>
+              <a:ext uri="{FF2B5EF4-FFF2-40B4-BE49-F238E27FC236}">
+                <a16:creationId xmlns:a16="http://schemas.microsoft.com/office/drawing/2014/main" id="{0B4A19DC-1CED-206A-5EC5-0B193A471D8C}"/>
+              </a:ext>
+            </a:extLst>
+          </p:cNvPr>
+          <p:cNvCxnSpPr>
+            <a:cxnSpLocks/>
+          </p:cNvCxnSpPr>
+          <p:nvPr/>
+        </p:nvCxnSpPr>
+        <p:spPr>
+          <a:xfrm>
+            <a:off x="10532166" y="2139077"/>
+            <a:ext cx="0" cy="1600200"/>
+          </a:xfrm>
+          <a:prstGeom prst="straightConnector1">
+            <a:avLst/>
+          </a:prstGeom>
+          <a:ln w="25400">
+            <a:solidFill>
+              <a:schemeClr val="tx1"/>
+            </a:solidFill>
+            <a:tailEnd type="stealth" w="lg" len="lg"/>
+          </a:ln>
+        </p:spPr>
+        <p:style>
+          <a:lnRef idx="1">
+            <a:schemeClr val="accent1"/>
+          </a:lnRef>
+          <a:fillRef idx="0">
+            <a:schemeClr val="accent1"/>
+          </a:fillRef>
+          <a:effectRef idx="0">
+            <a:schemeClr val="accent1"/>
+          </a:effectRef>
+          <a:fontRef idx="minor">
+            <a:schemeClr val="tx1"/>
+          </a:fontRef>
+        </p:style>
+      </p:cxnSp>
+      <p:cxnSp>
+        <p:nvCxnSpPr>
+          <p:cNvPr id="9" name="Straight Arrow Connector 8">
+            <a:extLst>
+              <a:ext uri="{FF2B5EF4-FFF2-40B4-BE49-F238E27FC236}">
+                <a16:creationId xmlns:a16="http://schemas.microsoft.com/office/drawing/2014/main" id="{63D82C40-E153-4A72-F269-FA1C5F4730AB}"/>
+              </a:ext>
+            </a:extLst>
+          </p:cNvPr>
+          <p:cNvCxnSpPr>
+            <a:cxnSpLocks/>
+          </p:cNvCxnSpPr>
+          <p:nvPr/>
+        </p:nvCxnSpPr>
+        <p:spPr>
+          <a:xfrm>
+            <a:off x="11318856" y="2127409"/>
+            <a:ext cx="0" cy="1828800"/>
+          </a:xfrm>
+          <a:prstGeom prst="straightConnector1">
+            <a:avLst/>
+          </a:prstGeom>
+          <a:ln w="25400">
+            <a:solidFill>
+              <a:schemeClr val="tx1"/>
+            </a:solidFill>
+            <a:tailEnd type="stealth" w="lg" len="lg"/>
+          </a:ln>
+        </p:spPr>
+        <p:style>
+          <a:lnRef idx="1">
+            <a:schemeClr val="accent1"/>
+          </a:lnRef>
+          <a:fillRef idx="0">
+            <a:schemeClr val="accent1"/>
+          </a:fillRef>
+          <a:effectRef idx="0">
+            <a:schemeClr val="accent1"/>
+          </a:effectRef>
+          <a:fontRef idx="minor">
+            <a:schemeClr val="tx1"/>
+          </a:fontRef>
+        </p:style>
+      </p:cxnSp>
+    </p:spTree>
+    <p:extLst>
+      <p:ext uri="{BB962C8B-B14F-4D97-AF65-F5344CB8AC3E}">
+        <p14:creationId xmlns:p14="http://schemas.microsoft.com/office/powerpoint/2010/main" val="4253660791"/>
       </p:ext>
     </p:extLst>
   </p:cSld>

</xml_diff>